<commit_message>
implemented csv functions, still need integrated
</commit_message>
<xml_diff>
--- a/ContextBasedRecommender.pptx
+++ b/ContextBasedRecommender.pptx
@@ -6703,6 +6703,21 @@
             </a:r>
           </a:p>
           <a:p>
+            <a:endParaRPr lang="en-US" dirty="0"/>
+          </a:p>
+          <a:p>
+            <a:r>
+              <a:rPr lang="en-US" dirty="0" smtClean="0"/>
+              <a:t>The solution is to use a library on Tesla such as pandas, but that will come with a substantial algorithmic rewrite due to the differences in the libraries</a:t>
+            </a:r>
+          </a:p>
+          <a:p>
+            <a:pPr marL="0" indent="0">
+              <a:buNone/>
+            </a:pPr>
+            <a:endParaRPr lang="en-US" dirty="0" smtClean="0"/>
+          </a:p>
+          <a:p>
             <a:pPr marL="0" indent="0">
               <a:buNone/>
             </a:pPr>

</xml_diff>